<commit_message>
added goodies with final icons
</commit_message>
<xml_diff>
--- a/doc/Star Pizzas.pptx
+++ b/doc/Star Pizzas.pptx
@@ -3928,8 +3928,17 @@
           <p:nvPr/>
         </p:nvPicPr>
         <p:blipFill>
-          <a:blip r:embed="rId3">
-            <a:extLst>
+          <a:blip r:embed="rId4">
+            <a:extLst>
+              <a:ext uri="{BEBA8EAE-BF5A-486C-A8C5-ECC9F3942E4B}">
+                <a14:imgProps xmlns:a14="http://schemas.microsoft.com/office/drawing/2010/main">
+                  <a14:imgLayer r:embed="rId5">
+                    <a14:imgEffect>
+                      <a14:backgroundRemoval t="10000" b="90000" l="10000" r="90000"/>
+                    </a14:imgEffect>
+                  </a14:imgLayer>
+                </a14:imgProps>
+              </a:ext>
               <a:ext uri="{28A0092B-C50C-407E-A947-70E740481C1C}">
                 <a14:useLocalDpi xmlns:a14="http://schemas.microsoft.com/office/drawing/2010/main" val="0"/>
               </a:ext>
@@ -4449,6 +4458,18 @@
         <p:blipFill>
           <a:blip r:embed="rId4">
             <a:extLst>
+              <a:ext uri="{BEBA8EAE-BF5A-486C-A8C5-ECC9F3942E4B}">
+                <a14:imgProps xmlns:a14="http://schemas.microsoft.com/office/drawing/2010/main">
+                  <a14:imgLayer r:embed="rId5">
+                    <a14:imgEffect>
+                      <a14:backgroundRemoval t="9778" b="89778" l="8889" r="89778">
+                        <a14:foregroundMark x1="8889" y1="51111" x2="8889" y2="51111"/>
+                        <a14:foregroundMark x1="89333" y1="49778" x2="89333" y2="49778"/>
+                      </a14:backgroundRemoval>
+                    </a14:imgEffect>
+                  </a14:imgLayer>
+                </a14:imgProps>
+              </a:ext>
               <a:ext uri="{28A0092B-C50C-407E-A947-70E740481C1C}">
                 <a14:useLocalDpi xmlns:a14="http://schemas.microsoft.com/office/drawing/2010/main" val="0"/>
               </a:ext>
@@ -4461,8 +4482,8 @@
         </p:blipFill>
         <p:spPr bwMode="auto">
           <a:xfrm>
-            <a:off x="3883479" y="936171"/>
-            <a:ext cx="619947" cy="619947"/>
+            <a:off x="3761979" y="683383"/>
+            <a:ext cx="529468" cy="529468"/>
           </a:xfrm>
           <a:prstGeom prst="rect">
             <a:avLst/>
@@ -4494,7 +4515,7 @@
           <p:nvPr/>
         </p:nvPicPr>
         <p:blipFill>
-          <a:blip r:embed="rId5">
+          <a:blip r:embed="rId6">
             <a:extLst>
               <a:ext uri="{28A0092B-C50C-407E-A947-70E740481C1C}">
                 <a14:useLocalDpi xmlns:a14="http://schemas.microsoft.com/office/drawing/2010/main" val="0"/>
@@ -4541,7 +4562,7 @@
           <p:nvPr/>
         </p:nvPicPr>
         <p:blipFill>
-          <a:blip r:embed="rId5">
+          <a:blip r:embed="rId6">
             <a:extLst>
               <a:ext uri="{28A0092B-C50C-407E-A947-70E740481C1C}">
                 <a14:useLocalDpi xmlns:a14="http://schemas.microsoft.com/office/drawing/2010/main" val="0"/>
@@ -4588,7 +4609,7 @@
           <p:nvPr/>
         </p:nvPicPr>
         <p:blipFill>
-          <a:blip r:embed="rId5">
+          <a:blip r:embed="rId6">
             <a:extLst>
               <a:ext uri="{28A0092B-C50C-407E-A947-70E740481C1C}">
                 <a14:useLocalDpi xmlns:a14="http://schemas.microsoft.com/office/drawing/2010/main" val="0"/>
@@ -4635,7 +4656,7 @@
           <p:nvPr/>
         </p:nvPicPr>
         <p:blipFill>
-          <a:blip r:embed="rId6">
+          <a:blip r:embed="rId7">
             <a:extLst>
               <a:ext uri="{28A0092B-C50C-407E-A947-70E740481C1C}">
                 <a14:useLocalDpi xmlns:a14="http://schemas.microsoft.com/office/drawing/2010/main" val="0"/>
@@ -4727,7 +4748,7 @@
           <p:nvPr/>
         </p:nvPicPr>
         <p:blipFill>
-          <a:blip r:embed="rId7">
+          <a:blip r:embed="rId8">
             <a:extLst>
               <a:ext uri="{28A0092B-C50C-407E-A947-70E740481C1C}">
                 <a14:useLocalDpi xmlns:a14="http://schemas.microsoft.com/office/drawing/2010/main" val="0"/>
@@ -4774,7 +4795,7 @@
           <p:nvPr/>
         </p:nvPicPr>
         <p:blipFill>
-          <a:blip r:embed="rId8">
+          <a:blip r:embed="rId9">
             <a:extLst>
               <a:ext uri="{28A0092B-C50C-407E-A947-70E740481C1C}">
                 <a14:useLocalDpi xmlns:a14="http://schemas.microsoft.com/office/drawing/2010/main" val="0"/>
@@ -4821,7 +4842,7 @@
           <p:nvPr/>
         </p:nvPicPr>
         <p:blipFill>
-          <a:blip r:embed="rId4">
+          <a:blip r:embed="rId10">
             <a:extLst>
               <a:ext uri="{28A0092B-C50C-407E-A947-70E740481C1C}">
                 <a14:useLocalDpi xmlns:a14="http://schemas.microsoft.com/office/drawing/2010/main" val="0"/>
@@ -4868,7 +4889,7 @@
           <p:nvPr/>
         </p:nvPicPr>
         <p:blipFill>
-          <a:blip r:embed="rId4">
+          <a:blip r:embed="rId10">
             <a:extLst>
               <a:ext uri="{28A0092B-C50C-407E-A947-70E740481C1C}">
                 <a14:useLocalDpi xmlns:a14="http://schemas.microsoft.com/office/drawing/2010/main" val="0"/>
@@ -5191,7 +5212,7 @@
           <p:nvPr/>
         </p:nvPicPr>
         <p:blipFill>
-          <a:blip r:embed="rId4">
+          <a:blip r:embed="rId10">
             <a:extLst>
               <a:ext uri="{28A0092B-C50C-407E-A947-70E740481C1C}">
                 <a14:useLocalDpi xmlns:a14="http://schemas.microsoft.com/office/drawing/2010/main" val="0"/>
@@ -5238,7 +5259,7 @@
           <p:nvPr/>
         </p:nvPicPr>
         <p:blipFill>
-          <a:blip r:embed="rId4">
+          <a:blip r:embed="rId10">
             <a:extLst>
               <a:ext uri="{28A0092B-C50C-407E-A947-70E740481C1C}">
                 <a14:useLocalDpi xmlns:a14="http://schemas.microsoft.com/office/drawing/2010/main" val="0"/>
@@ -5285,7 +5306,7 @@
           <p:nvPr/>
         </p:nvPicPr>
         <p:blipFill>
-          <a:blip r:embed="rId4">
+          <a:blip r:embed="rId10">
             <a:extLst>
               <a:ext uri="{28A0092B-C50C-407E-A947-70E740481C1C}">
                 <a14:useLocalDpi xmlns:a14="http://schemas.microsoft.com/office/drawing/2010/main" val="0"/>
@@ -5332,7 +5353,7 @@
           <p:nvPr/>
         </p:nvPicPr>
         <p:blipFill>
-          <a:blip r:embed="rId8">
+          <a:blip r:embed="rId9">
             <a:extLst>
               <a:ext uri="{28A0092B-C50C-407E-A947-70E740481C1C}">
                 <a14:useLocalDpi xmlns:a14="http://schemas.microsoft.com/office/drawing/2010/main" val="0"/>
@@ -5952,7 +5973,7 @@
           </p:cNvPicPr>
           <p:nvPr/>
         </p:nvPicPr>
-        <p:blipFill>
+        <p:blipFill rotWithShape="1">
           <a:blip r:embed="rId2">
             <a:extLst>
               <a:ext uri="{BEBA8EAE-BF5A-486C-A8C5-ECC9F3942E4B}">
@@ -5972,15 +5993,13 @@
               </a:ext>
             </a:extLst>
           </a:blip>
-          <a:srcRect/>
-          <a:stretch>
-            <a:fillRect/>
-          </a:stretch>
+          <a:srcRect l="20592" t="18049" r="17807" b="10887"/>
+          <a:stretch/>
         </p:blipFill>
         <p:spPr bwMode="auto">
           <a:xfrm>
-            <a:off x="436789" y="730022"/>
-            <a:ext cx="1962150" cy="2943225"/>
+            <a:off x="840828" y="1261241"/>
+            <a:ext cx="1208689" cy="2091560"/>
           </a:xfrm>
           <a:prstGeom prst="rect">
             <a:avLst/>
@@ -6320,7 +6339,7 @@
           </p:cNvPicPr>
           <p:nvPr/>
         </p:nvPicPr>
-        <p:blipFill>
+        <p:blipFill rotWithShape="1">
           <a:blip r:embed="rId2">
             <a:extLst>
               <a:ext uri="{BEBA8EAE-BF5A-486C-A8C5-ECC9F3942E4B}">
@@ -6344,15 +6363,13 @@
               </a:ext>
             </a:extLst>
           </a:blip>
-          <a:srcRect/>
-          <a:stretch>
-            <a:fillRect/>
-          </a:stretch>
+          <a:srcRect l="269" t="4551" r="7696"/>
+          <a:stretch/>
         </p:blipFill>
         <p:spPr bwMode="auto">
           <a:xfrm rot="10800000">
-            <a:off x="824867" y="1038320"/>
-            <a:ext cx="1451705" cy="1422799"/>
+            <a:off x="936594" y="1038319"/>
+            <a:ext cx="1336069" cy="1358038"/>
           </a:xfrm>
           <a:prstGeom prst="rect">
             <a:avLst/>

</xml_diff>